<commit_message>
Signed-off-by: Mr Zhang <1053338363@qq.com>
</commit_message>
<xml_diff>
--- a/个人博客项目/myblog.pptx
+++ b/个人博客项目/myblog.pptx
@@ -216,7 +216,7 @@
           <a:p>
             <a:fld id="{7F25A8C7-CC1A-4A08-9B4B-31F43B054C7F}" type="datetimeFigureOut">
               <a:rPr lang="zh-CN" altLang="en-US" smtClean="0"/>
-              <a:t>2018/12/14 Friday</a:t>
+              <a:t>2019/1/25 Friday</a:t>
             </a:fld>
             <a:endParaRPr lang="zh-CN" altLang="en-US"/>
           </a:p>
@@ -611,7 +611,7 @@
           <a:p>
             <a:fld id="{D997B5FA-0921-464F-AAE1-844C04324D75}" type="datetimeFigureOut">
               <a:rPr lang="zh-CN" altLang="en-US" smtClean="0"/>
-              <a:t>2018/12/14 Friday</a:t>
+              <a:t>2019/1/25 Friday</a:t>
             </a:fld>
             <a:endParaRPr lang="zh-CN" altLang="en-US"/>
           </a:p>
@@ -701,7 +701,7 @@
           <a:p>
             <a:fld id="{760FBDFE-C587-4B4C-A407-44438C67B59E}" type="datetimeFigureOut">
               <a:rPr lang="zh-CN" altLang="en-US" smtClean="0"/>
-              <a:t>2018/12/14 Friday</a:t>
+              <a:t>2019/1/25 Friday</a:t>
             </a:fld>
             <a:endParaRPr lang="zh-CN" altLang="en-US"/>
           </a:p>
@@ -936,7 +936,7 @@
           <a:p>
             <a:fld id="{760FBDFE-C587-4B4C-A407-44438C67B59E}" type="datetimeFigureOut">
               <a:rPr lang="zh-CN" altLang="en-US" smtClean="0"/>
-              <a:t>2018/12/14 Friday</a:t>
+              <a:t>2019/1/25 Friday</a:t>
             </a:fld>
             <a:endParaRPr lang="zh-CN" altLang="en-US"/>
           </a:p>
@@ -1026,7 +1026,7 @@
           <a:p>
             <a:fld id="{20DD7636-5BE1-44BC-BB5F-15739D9E18E1}" type="datetimeFigureOut">
               <a:rPr lang="zh-CN" altLang="en-US" smtClean="0"/>
-              <a:t>2018/12/14 Friday</a:t>
+              <a:t>2019/1/25 Friday</a:t>
             </a:fld>
             <a:endParaRPr lang="zh-CN" altLang="en-US"/>
           </a:p>
@@ -1283,7 +1283,7 @@
           <a:p>
             <a:fld id="{760FBDFE-C587-4B4C-A407-44438C67B59E}" type="datetimeFigureOut">
               <a:rPr lang="zh-CN" altLang="en-US" smtClean="0"/>
-              <a:t>2018/12/14 Friday</a:t>
+              <a:t>2019/1/25 Friday</a:t>
             </a:fld>
             <a:endParaRPr lang="zh-CN" altLang="en-US"/>
           </a:p>
@@ -1642,7 +1642,7 @@
           <a:p>
             <a:fld id="{760FBDFE-C587-4B4C-A407-44438C67B59E}" type="datetimeFigureOut">
               <a:rPr lang="zh-CN" altLang="en-US" smtClean="0"/>
-              <a:t>2018/12/14 Friday</a:t>
+              <a:t>2019/1/25 Friday</a:t>
             </a:fld>
             <a:endParaRPr lang="zh-CN" altLang="en-US"/>
           </a:p>
@@ -1769,7 +1769,7 @@
           <a:p>
             <a:fld id="{20DD7636-5BE1-44BC-BB5F-15739D9E18E1}" type="datetimeFigureOut">
               <a:rPr lang="zh-CN" altLang="en-US" smtClean="0"/>
-              <a:t>2018/12/14 Friday</a:t>
+              <a:t>2019/1/25 Friday</a:t>
             </a:fld>
             <a:endParaRPr lang="zh-CN" altLang="en-US"/>
           </a:p>
@@ -1898,7 +1898,7 @@
           <a:p>
             <a:fld id="{760FBDFE-C587-4B4C-A407-44438C67B59E}" type="datetimeFigureOut">
               <a:rPr lang="zh-CN" altLang="en-US" smtClean="0"/>
-              <a:t>2018/12/14 Friday</a:t>
+              <a:t>2019/1/25 Friday</a:t>
             </a:fld>
             <a:endParaRPr lang="zh-CN" altLang="en-US"/>
           </a:p>
@@ -2149,7 +2149,7 @@
           <a:p>
             <a:fld id="{9EFD9D74-47D9-4702-A33C-335B63B48DBF}" type="datetimeFigureOut">
               <a:rPr lang="zh-CN" altLang="en-US" smtClean="0"/>
-              <a:t>2018/12/14 Friday</a:t>
+              <a:t>2019/1/25 Friday</a:t>
             </a:fld>
             <a:endParaRPr lang="zh-CN" altLang="en-US"/>
           </a:p>
@@ -2328,7 +2328,7 @@
           <a:p>
             <a:fld id="{760FBDFE-C587-4B4C-A407-44438C67B59E}" type="datetimeFigureOut">
               <a:rPr lang="zh-CN" altLang="en-US" smtClean="0"/>
-              <a:t>2018/12/14 Friday</a:t>
+              <a:t>2019/1/25 Friday</a:t>
             </a:fld>
             <a:endParaRPr lang="zh-CN" altLang="en-US"/>
           </a:p>
@@ -2544,7 +2544,7 @@
           <a:p>
             <a:fld id="{D997B5FA-0921-464F-AAE1-844C04324D75}" type="datetimeFigureOut">
               <a:rPr lang="zh-CN" altLang="en-US" smtClean="0"/>
-              <a:t>2018/12/14 Friday</a:t>
+              <a:t>2019/1/25 Friday</a:t>
             </a:fld>
             <a:endParaRPr lang="zh-CN" altLang="en-US"/>
           </a:p>
@@ -3081,7 +3081,7 @@
                 <a:ea typeface="宋体" panose="02010600030101010101" pitchFamily="2" charset="-122"/>
                 <a:sym typeface="+mn-ea"/>
               </a:rPr>
-              <a:t>jess</a:t>
+              <a:t>JS</a:t>
             </a:r>
             <a:r>
               <a:rPr lang="zh-CN" altLang="en-US" b="1">
@@ -3228,7 +3228,7 @@
                 <a:ea typeface="宋体" panose="02010600030101010101" pitchFamily="2" charset="-122"/>
                 <a:sym typeface="+mn-ea"/>
               </a:rPr>
-              <a:t>jess</a:t>
+              <a:t>JS</a:t>
             </a:r>
             <a:r>
               <a:rPr lang="zh-CN" altLang="en-US" b="1">
@@ -3264,7 +3264,7 @@
                 <a:ea typeface="宋体" panose="02010600030101010101" pitchFamily="2" charset="-122"/>
                 <a:sym typeface="+mn-ea"/>
               </a:rPr>
-              <a:t>jess</a:t>
+              <a:t>JS</a:t>
             </a:r>
             <a:r>
               <a:rPr lang="zh-CN" altLang="en-US" b="1">
@@ -9635,7 +9635,7 @@
                 <a:ea typeface="宋体" panose="02010600030101010101" pitchFamily="2" charset="-122"/>
                 <a:sym typeface="+mn-ea"/>
               </a:rPr>
-              <a:t>jess</a:t>
+              <a:t>JS</a:t>
             </a:r>
             <a:r>
               <a:rPr lang="zh-CN" altLang="en-US" b="1">

</xml_diff>